<commit_message>
Fall week 3 report.
</commit_message>
<xml_diff>
--- a/10.10.pptx
+++ b/10.10.pptx
@@ -3112,7 +3112,7 @@
           <p:nvPr>
             <p:extLst>
               <p:ext uri="{D42A27DB-BD31-4B8C-83A1-F6EECF244321}">
-                <p14:modId xmlns:p14="http://schemas.microsoft.com/office/powerpoint/2010/main" val="1898502532"/>
+                <p14:modId xmlns:p14="http://schemas.microsoft.com/office/powerpoint/2010/main" val="3190375179"/>
               </p:ext>
             </p:extLst>
           </p:nvPr>
@@ -3306,65 +3306,8 @@
                           <a:ea typeface="+mn-ea"/>
                           <a:cs typeface="Calibri" pitchFamily="34" charset="0"/>
                         </a:rPr>
-                        <a:t>Matt </a:t>
+                        <a:t>Ammon – None</a:t>
                       </a:r>
-                      <a:r>
-                        <a:rPr kumimoji="0" lang="mr-IN" sz="1000" b="0" i="0" u="none" strike="noStrike" kern="1200" cap="none" normalizeH="0" baseline="0" dirty="0">
-                          <a:ln>
-                            <a:noFill/>
-                          </a:ln>
-                          <a:solidFill>
-                            <a:schemeClr val="tx1"/>
-                          </a:solidFill>
-                          <a:effectLst/>
-                          <a:latin typeface="Calibri" pitchFamily="34" charset="0"/>
-                          <a:ea typeface="+mn-ea"/>
-                          <a:cs typeface="Calibri" pitchFamily="34" charset="0"/>
-                        </a:rPr>
-                        <a:t>–</a:t>
-                      </a:r>
-                      <a:r>
-                        <a:rPr kumimoji="0" lang="en-AU" sz="1000" b="0" i="0" u="none" strike="noStrike" kern="1200" cap="none" normalizeH="0" baseline="0" dirty="0">
-                          <a:ln>
-                            <a:noFill/>
-                          </a:ln>
-                          <a:solidFill>
-                            <a:schemeClr val="tx1"/>
-                          </a:solidFill>
-                          <a:effectLst/>
-                          <a:latin typeface="Calibri" pitchFamily="34" charset="0"/>
-                          <a:ea typeface="+mn-ea"/>
-                          <a:cs typeface="Calibri" pitchFamily="34" charset="0"/>
-                        </a:rPr>
-                        <a:t> Updated architecture and design sections for microcontroller and ultra-wide controllers in Revision v0.3 of Spec</a:t>
-                      </a:r>
-                      <a:r>
-                        <a:rPr kumimoji="0" lang="en-AU" sz="1000" b="0" i="0" u="none" strike="noStrike" kern="1200" cap="none" normalizeH="0" baseline="0">
-                          <a:ln>
-                            <a:noFill/>
-                          </a:ln>
-                          <a:solidFill>
-                            <a:schemeClr val="tx1"/>
-                          </a:solidFill>
-                          <a:effectLst/>
-                          <a:latin typeface="Calibri" pitchFamily="34" charset="0"/>
-                          <a:ea typeface="+mn-ea"/>
-                          <a:cs typeface="Calibri" pitchFamily="34" charset="0"/>
-                        </a:rPr>
-                        <a:t>. </a:t>
-                      </a:r>
-                      <a:endParaRPr kumimoji="0" lang="en-AU" sz="1000" b="0" i="0" u="none" strike="noStrike" kern="1200" cap="none" normalizeH="0" baseline="0" dirty="0">
-                        <a:ln>
-                          <a:noFill/>
-                        </a:ln>
-                        <a:solidFill>
-                          <a:schemeClr val="tx1"/>
-                        </a:solidFill>
-                        <a:effectLst/>
-                        <a:latin typeface="Calibri" pitchFamily="34" charset="0"/>
-                        <a:ea typeface="+mn-ea"/>
-                        <a:cs typeface="Calibri" pitchFamily="34" charset="0"/>
-                      </a:endParaRPr>
                     </a:p>
                     <a:p>
                       <a:pPr marL="190500" marR="0" lvl="0" indent="-190500" algn="l" defTabSz="695325" rtl="0" eaLnBrk="1" fontAlgn="base" latinLnBrk="0" hangingPunct="1">
@@ -3399,23 +3342,29 @@
                           <a:ea typeface="+mn-ea"/>
                           <a:cs typeface="Calibri" pitchFamily="34" charset="0"/>
                         </a:rPr>
-                        <a:t>Matt </a:t>
+                        <a:t>Jake – made proposal “foil”</a:t>
                       </a:r>
-                      <a:r>
-                        <a:rPr kumimoji="0" lang="mr-IN" sz="1000" b="0" i="0" u="none" strike="noStrike" kern="1200" cap="none" normalizeH="0" baseline="0" dirty="0">
-                          <a:ln>
-                            <a:noFill/>
-                          </a:ln>
-                          <a:solidFill>
-                            <a:schemeClr val="tx1"/>
-                          </a:solidFill>
-                          <a:effectLst/>
-                          <a:latin typeface="Calibri" pitchFamily="34" charset="0"/>
-                          <a:ea typeface="+mn-ea"/>
-                          <a:cs typeface="Calibri" pitchFamily="34" charset="0"/>
-                        </a:rPr>
-                        <a:t>–</a:t>
-                      </a:r>
+                    </a:p>
+                    <a:p>
+                      <a:pPr marL="190500" marR="0" lvl="0" indent="-190500" algn="l" defTabSz="695325" rtl="0" eaLnBrk="1" fontAlgn="base" latinLnBrk="0" hangingPunct="1">
+                        <a:lnSpc>
+                          <a:spcPct val="90000"/>
+                        </a:lnSpc>
+                        <a:spcBef>
+                          <a:spcPct val="30000"/>
+                        </a:spcBef>
+                        <a:spcAft>
+                          <a:spcPct val="0"/>
+                        </a:spcAft>
+                        <a:buClr>
+                          <a:srgbClr val="0A1B5F"/>
+                        </a:buClr>
+                        <a:buSzTx/>
+                        <a:buFontTx/>
+                        <a:buChar char="•"/>
+                        <a:tabLst/>
+                        <a:defRPr/>
+                      </a:pPr>
                       <a:r>
                         <a:rPr kumimoji="0" lang="en-AU" sz="1000" b="0" i="0" u="none" strike="noStrike" kern="1200" cap="none" normalizeH="0" baseline="0" dirty="0">
                           <a:ln>
@@ -3429,7 +3378,7 @@
                           <a:ea typeface="+mn-ea"/>
                           <a:cs typeface="Calibri" pitchFamily="34" charset="0"/>
                         </a:rPr>
-                        <a:t> Met with customer to review L2 protocol extensions.  </a:t>
+                        <a:t>Alex – stuff and possibly things</a:t>
                       </a:r>
                     </a:p>
                     <a:p>
@@ -3533,7 +3482,7 @@
           <p:nvPr>
             <p:extLst>
               <p:ext uri="{D42A27DB-BD31-4B8C-83A1-F6EECF244321}">
-                <p14:modId xmlns:p14="http://schemas.microsoft.com/office/powerpoint/2010/main" val="2299075972"/>
+                <p14:modId xmlns:p14="http://schemas.microsoft.com/office/powerpoint/2010/main" val="361514992"/>
               </p:ext>
             </p:extLst>
           </p:nvPr>
@@ -3691,7 +3640,73 @@
                           <a:ea typeface="+mn-ea"/>
                           <a:cs typeface="Calibri" pitchFamily="34" charset="0"/>
                         </a:rPr>
-                        <a:t>[Detail the key actions planned for the next period of work.  What you state here should constitute key achievements for the next week. ]</a:t>
+                        <a:t>Do “</a:t>
+                      </a:r>
+                      <a:r>
+                        <a:rPr kumimoji="0" lang="en-AU" sz="1000" b="0" i="0" u="none" strike="noStrike" kern="1200" cap="none" normalizeH="0" baseline="0" dirty="0" err="1">
+                          <a:ln>
+                            <a:noFill/>
+                          </a:ln>
+                          <a:solidFill>
+                            <a:schemeClr val="tx1"/>
+                          </a:solidFill>
+                          <a:effectLst/>
+                          <a:latin typeface="Calibri" pitchFamily="34" charset="0"/>
+                          <a:ea typeface="+mn-ea"/>
+                          <a:cs typeface="Calibri" pitchFamily="34" charset="0"/>
+                        </a:rPr>
+                        <a:t>Hellow</a:t>
+                      </a:r>
+                      <a:r>
+                        <a:rPr kumimoji="0" lang="en-AU" sz="1000" b="0" i="0" u="none" strike="noStrike" kern="1200" cap="none" normalizeH="0" baseline="0" dirty="0">
+                          <a:ln>
+                            <a:noFill/>
+                          </a:ln>
+                          <a:solidFill>
+                            <a:schemeClr val="tx1"/>
+                          </a:solidFill>
+                          <a:effectLst/>
+                          <a:latin typeface="Calibri" pitchFamily="34" charset="0"/>
+                          <a:ea typeface="+mn-ea"/>
+                          <a:cs typeface="Calibri" pitchFamily="34" charset="0"/>
+                        </a:rPr>
+                        <a:t> World” in ROS</a:t>
+                      </a:r>
+                    </a:p>
+                    <a:p>
+                      <a:pPr marL="190500" marR="0" lvl="0" indent="-190500" algn="l" defTabSz="695325" rtl="0" eaLnBrk="1" fontAlgn="base" latinLnBrk="0" hangingPunct="1">
+                        <a:lnSpc>
+                          <a:spcPct val="90000"/>
+                        </a:lnSpc>
+                        <a:spcBef>
+                          <a:spcPct val="30000"/>
+                        </a:spcBef>
+                        <a:spcAft>
+                          <a:spcPct val="0"/>
+                        </a:spcAft>
+                        <a:buClr>
+                          <a:srgbClr val="0A1B5F"/>
+                        </a:buClr>
+                        <a:buSzTx/>
+                        <a:buFontTx/>
+                        <a:buChar char="•"/>
+                        <a:tabLst/>
+                        <a:defRPr/>
+                      </a:pPr>
+                      <a:r>
+                        <a:rPr kumimoji="0" lang="en-AU" sz="1000" b="0" i="0" u="none" strike="noStrike" kern="1200" cap="none" normalizeH="0" baseline="0" dirty="0">
+                          <a:ln>
+                            <a:noFill/>
+                          </a:ln>
+                          <a:solidFill>
+                            <a:schemeClr val="tx1"/>
+                          </a:solidFill>
+                          <a:effectLst/>
+                          <a:latin typeface="Calibri" pitchFamily="34" charset="0"/>
+                          <a:ea typeface="+mn-ea"/>
+                          <a:cs typeface="Calibri" pitchFamily="34" charset="0"/>
+                        </a:rPr>
+                        <a:t>Control the burger-bot directly with the Xbox controller</a:t>
                       </a:r>
                     </a:p>
                     <a:p>
@@ -3795,7 +3810,7 @@
           <p:nvPr>
             <p:extLst>
               <p:ext uri="{D42A27DB-BD31-4B8C-83A1-F6EECF244321}">
-                <p14:modId xmlns:p14="http://schemas.microsoft.com/office/powerpoint/2010/main" val="3138332154"/>
+                <p14:modId xmlns:p14="http://schemas.microsoft.com/office/powerpoint/2010/main" val="2898068219"/>
               </p:ext>
             </p:extLst>
           </p:nvPr>
@@ -3952,7 +3967,7 @@
                           <a:latin typeface="Calibri" pitchFamily="34" charset="0"/>
                           <a:cs typeface="Calibri" pitchFamily="34" charset="0"/>
                         </a:rPr>
-                        <a:t>[Detail key risks and issues.  It is critical to outline any risks here and describe the impact.  Identify mitigation strategies. ]</a:t>
+                        <a:t>Primary concerns include finding a starting point for this project, having a place to stand with access to tools, getting a foothold.</a:t>
                       </a:r>
                     </a:p>
                   </a:txBody>
@@ -4023,14 +4038,14 @@
           <p:nvPr>
             <p:extLst>
               <p:ext uri="{D42A27DB-BD31-4B8C-83A1-F6EECF244321}">
-                <p14:modId xmlns:p14="http://schemas.microsoft.com/office/powerpoint/2010/main" val="3621723298"/>
+                <p14:modId xmlns:p14="http://schemas.microsoft.com/office/powerpoint/2010/main" val="3884325162"/>
               </p:ext>
             </p:extLst>
           </p:nvPr>
         </p:nvGraphicFramePr>
         <p:xfrm>
           <a:off x="4698023" y="2446475"/>
-          <a:ext cx="4104543" cy="1630597"/>
+          <a:ext cx="4104543" cy="1683255"/>
         </p:xfrm>
         <a:graphic>
           <a:graphicData uri="http://schemas.openxmlformats.org/drawingml/2006/table">
@@ -4466,17 +4481,20 @@
                         </a:tabLst>
                         <a:defRPr/>
                       </a:pPr>
-                      <a:endParaRPr kumimoji="0" lang="en-AU" sz="1000" b="0" i="0" u="none" strike="noStrike" cap="none" normalizeH="0" baseline="0" dirty="0">
-                        <a:ln>
-                          <a:noFill/>
-                        </a:ln>
-                        <a:solidFill>
-                          <a:schemeClr val="tx1"/>
-                        </a:solidFill>
-                        <a:effectLst/>
-                        <a:latin typeface="Calibri" pitchFamily="34" charset="0"/>
-                        <a:cs typeface="Calibri" pitchFamily="34" charset="0"/>
-                      </a:endParaRPr>
+                      <a:r>
+                        <a:rPr kumimoji="0" lang="en-AU" sz="1000" b="0" i="0" u="none" strike="noStrike" cap="none" normalizeH="0" baseline="0" dirty="0">
+                          <a:ln>
+                            <a:noFill/>
+                          </a:ln>
+                          <a:solidFill>
+                            <a:schemeClr val="tx1"/>
+                          </a:solidFill>
+                          <a:effectLst/>
+                          <a:latin typeface="Calibri" pitchFamily="34" charset="0"/>
+                          <a:cs typeface="Calibri" pitchFamily="34" charset="0"/>
+                        </a:rPr>
+                        <a:t>Drive bot with controller</a:t>
+                      </a:r>
                     </a:p>
                   </a:txBody>
                   <a:tcPr marL="43200" marR="0" marT="46800" marB="46800" horzOverflow="overflow">
@@ -4553,20 +4571,6 @@
                         </a:tabLst>
                       </a:pPr>
                       <a:r>
-                        <a:rPr kumimoji="0" lang="en-AU" sz="1000" b="0" i="0" u="none" strike="noStrike" cap="none" normalizeH="0" baseline="0" dirty="0" err="1">
-                          <a:ln>
-                            <a:noFill/>
-                          </a:ln>
-                          <a:solidFill>
-                            <a:schemeClr val="tx1"/>
-                          </a:solidFill>
-                          <a:effectLst/>
-                          <a:latin typeface="Calibri" pitchFamily="34" charset="0"/>
-                          <a:cs typeface="Calibri" pitchFamily="34" charset="0"/>
-                        </a:rPr>
-                        <a:t>dd</a:t>
-                      </a:r>
-                      <a:r>
                         <a:rPr kumimoji="0" lang="en-AU" sz="1000" b="0" i="0" u="none" strike="noStrike" cap="none" normalizeH="0" baseline="0" dirty="0">
                           <a:ln>
                             <a:noFill/>
@@ -4578,33 +4582,8 @@
                           <a:latin typeface="Calibri" pitchFamily="34" charset="0"/>
                           <a:cs typeface="Calibri" pitchFamily="34" charset="0"/>
                         </a:rPr>
-                        <a:t>/mm/</a:t>
+                        <a:t>2018-Oct-17</a:t>
                       </a:r>
-                      <a:r>
-                        <a:rPr kumimoji="0" lang="en-AU" sz="1000" b="0" i="0" u="none" strike="noStrike" cap="none" normalizeH="0" baseline="0" dirty="0" err="1">
-                          <a:ln>
-                            <a:noFill/>
-                          </a:ln>
-                          <a:solidFill>
-                            <a:schemeClr val="tx1"/>
-                          </a:solidFill>
-                          <a:effectLst/>
-                          <a:latin typeface="Calibri" pitchFamily="34" charset="0"/>
-                          <a:cs typeface="Calibri" pitchFamily="34" charset="0"/>
-                        </a:rPr>
-                        <a:t>yy</a:t>
-                      </a:r>
-                      <a:endParaRPr kumimoji="0" lang="en-AU" sz="1000" b="0" i="0" u="none" strike="noStrike" cap="none" normalizeH="0" baseline="0" dirty="0">
-                        <a:ln>
-                          <a:noFill/>
-                        </a:ln>
-                        <a:solidFill>
-                          <a:schemeClr val="tx1"/>
-                        </a:solidFill>
-                        <a:effectLst/>
-                        <a:latin typeface="Calibri" pitchFamily="34" charset="0"/>
-                        <a:cs typeface="Calibri" pitchFamily="34" charset="0"/>
-                      </a:endParaRPr>
                     </a:p>
                   </a:txBody>
                   <a:tcPr marL="43200" marR="0" marT="46800" marB="46800" anchor="ctr" horzOverflow="overflow">
@@ -4681,7 +4660,7 @@
                         </a:tabLst>
                       </a:pPr>
                       <a:r>
-                        <a:rPr kumimoji="0" lang="en-AU" sz="1000" b="0" i="0" u="none" strike="noStrike" cap="none" normalizeH="0" baseline="0">
+                        <a:rPr kumimoji="0" lang="en-AU" sz="1000" b="0" i="0" u="none" strike="noStrike" cap="none" normalizeH="0" baseline="0" dirty="0">
                           <a:ln>
                             <a:noFill/>
                           </a:ln>
@@ -4692,19 +4671,8 @@
                           <a:latin typeface="Calibri" pitchFamily="34" charset="0"/>
                           <a:cs typeface="Calibri" pitchFamily="34" charset="0"/>
                         </a:rPr>
-                        <a:t>dd/mm/yy</a:t>
+                        <a:t>2020-Oct-17</a:t>
                       </a:r>
-                      <a:endParaRPr kumimoji="0" lang="en-AU" sz="1000" b="0" i="0" u="none" strike="noStrike" cap="none" normalizeH="0" baseline="0" dirty="0">
-                        <a:ln>
-                          <a:noFill/>
-                        </a:ln>
-                        <a:solidFill>
-                          <a:schemeClr val="tx1"/>
-                        </a:solidFill>
-                        <a:effectLst/>
-                        <a:latin typeface="Calibri" pitchFamily="34" charset="0"/>
-                        <a:cs typeface="Calibri" pitchFamily="34" charset="0"/>
-                      </a:endParaRPr>
                     </a:p>
                   </a:txBody>
                   <a:tcPr marL="43200" marR="0" marT="46800" marB="46800" anchor="ctr" horzOverflow="overflow">
@@ -4878,17 +4846,20 @@
                         </a:tabLst>
                         <a:defRPr/>
                       </a:pPr>
-                      <a:endParaRPr kumimoji="0" lang="en-AU" sz="1000" b="0" i="0" u="none" strike="noStrike" cap="none" normalizeH="0" baseline="0" dirty="0">
-                        <a:ln>
-                          <a:noFill/>
-                        </a:ln>
-                        <a:solidFill>
-                          <a:schemeClr val="tx1"/>
-                        </a:solidFill>
-                        <a:effectLst/>
-                        <a:latin typeface="Calibri" pitchFamily="34" charset="0"/>
-                        <a:cs typeface="Calibri" pitchFamily="34" charset="0"/>
-                      </a:endParaRPr>
+                      <a:r>
+                        <a:rPr kumimoji="0" lang="en-AU" sz="1000" b="0" i="0" u="none" strike="noStrike" cap="none" normalizeH="0" baseline="0" dirty="0">
+                          <a:ln>
+                            <a:noFill/>
+                          </a:ln>
+                          <a:solidFill>
+                            <a:schemeClr val="tx1"/>
+                          </a:solidFill>
+                          <a:effectLst/>
+                          <a:latin typeface="Calibri" pitchFamily="34" charset="0"/>
+                          <a:cs typeface="Calibri" pitchFamily="34" charset="0"/>
+                        </a:rPr>
+                        <a:t>Drive bot with smoothing algorithm</a:t>
+                      </a:r>
                     </a:p>
                   </a:txBody>
                   <a:tcPr marL="43200" marR="0" marT="46800" marB="46800" horzOverflow="overflow">
@@ -4965,7 +4936,7 @@
                         </a:tabLst>
                       </a:pPr>
                       <a:r>
-                        <a:rPr kumimoji="0" lang="en-AU" sz="1000" b="0" i="0" u="none" strike="noStrike" cap="none" normalizeH="0" baseline="0">
+                        <a:rPr kumimoji="0" lang="en-AU" sz="1000" b="0" i="0" u="none" strike="noStrike" cap="none" normalizeH="0" baseline="0" dirty="0">
                           <a:ln>
                             <a:noFill/>
                           </a:ln>
@@ -4976,19 +4947,8 @@
                           <a:latin typeface="Calibri" pitchFamily="34" charset="0"/>
                           <a:cs typeface="Calibri" pitchFamily="34" charset="0"/>
                         </a:rPr>
-                        <a:t>dd/mm/yy</a:t>
+                        <a:t>2018-Nov-17</a:t>
                       </a:r>
-                      <a:endParaRPr kumimoji="0" lang="en-AU" sz="1000" b="0" i="0" u="none" strike="noStrike" cap="none" normalizeH="0" baseline="0" dirty="0">
-                        <a:ln>
-                          <a:noFill/>
-                        </a:ln>
-                        <a:solidFill>
-                          <a:schemeClr val="tx1"/>
-                        </a:solidFill>
-                        <a:effectLst/>
-                        <a:latin typeface="Calibri" pitchFamily="34" charset="0"/>
-                        <a:cs typeface="Calibri" pitchFamily="34" charset="0"/>
-                      </a:endParaRPr>
                     </a:p>
                   </a:txBody>
                   <a:tcPr marL="43200" marR="0" marT="46800" marB="46800" anchor="ctr" horzOverflow="overflow">
@@ -5065,7 +5025,7 @@
                         </a:tabLst>
                       </a:pPr>
                       <a:r>
-                        <a:rPr kumimoji="0" lang="en-AU" sz="1000" b="0" i="0" u="none" strike="noStrike" cap="none" normalizeH="0" baseline="0">
+                        <a:rPr kumimoji="0" lang="en-AU" sz="1000" b="0" i="0" u="none" strike="noStrike" cap="none" normalizeH="0" baseline="0" dirty="0">
                           <a:ln>
                             <a:noFill/>
                           </a:ln>
@@ -5076,19 +5036,8 @@
                           <a:latin typeface="Calibri" pitchFamily="34" charset="0"/>
                           <a:cs typeface="Calibri" pitchFamily="34" charset="0"/>
                         </a:rPr>
-                        <a:t>dd/mm/yy</a:t>
+                        <a:t>2024-Dec-25</a:t>
                       </a:r>
-                      <a:endParaRPr kumimoji="0" lang="en-AU" sz="1000" b="0" i="0" u="none" strike="noStrike" cap="none" normalizeH="0" baseline="0" dirty="0">
-                        <a:ln>
-                          <a:noFill/>
-                        </a:ln>
-                        <a:solidFill>
-                          <a:schemeClr val="tx1"/>
-                        </a:solidFill>
-                        <a:effectLst/>
-                        <a:latin typeface="Calibri" pitchFamily="34" charset="0"/>
-                        <a:cs typeface="Calibri" pitchFamily="34" charset="0"/>
-                      </a:endParaRPr>
                     </a:p>
                   </a:txBody>
                   <a:tcPr marL="43200" marR="0" marT="46800" marB="46800" anchor="ctr" horzOverflow="overflow">
@@ -5262,17 +5211,20 @@
                         </a:tabLst>
                         <a:defRPr/>
                       </a:pPr>
-                      <a:endParaRPr kumimoji="0" lang="en-AU" sz="1000" b="0" i="0" u="none" strike="noStrike" cap="none" normalizeH="0" baseline="0" dirty="0">
-                        <a:ln>
-                          <a:noFill/>
-                        </a:ln>
-                        <a:solidFill>
-                          <a:schemeClr val="tx1"/>
-                        </a:solidFill>
-                        <a:effectLst/>
-                        <a:latin typeface="Calibri" pitchFamily="34" charset="0"/>
-                        <a:cs typeface="Calibri" pitchFamily="34" charset="0"/>
-                      </a:endParaRPr>
+                      <a:r>
+                        <a:rPr kumimoji="0" lang="en-AU" sz="1000" b="0" i="0" u="none" strike="noStrike" cap="none" normalizeH="0" baseline="0" dirty="0">
+                          <a:ln>
+                            <a:noFill/>
+                          </a:ln>
+                          <a:solidFill>
+                            <a:schemeClr val="tx1"/>
+                          </a:solidFill>
+                          <a:effectLst/>
+                          <a:latin typeface="Calibri" pitchFamily="34" charset="0"/>
+                          <a:cs typeface="Calibri" pitchFamily="34" charset="0"/>
+                        </a:rPr>
+                        <a:t>Execute SLAM on robot</a:t>
+                      </a:r>
                     </a:p>
                   </a:txBody>
                   <a:tcPr marL="43200" marR="0" marT="46800" marB="46800" horzOverflow="overflow">
@@ -5349,7 +5301,7 @@
                         </a:tabLst>
                       </a:pPr>
                       <a:r>
-                        <a:rPr kumimoji="0" lang="en-AU" sz="1000" b="0" i="0" u="none" strike="noStrike" cap="none" normalizeH="0" baseline="0">
+                        <a:rPr kumimoji="0" lang="en-AU" sz="1000" b="0" i="0" u="none" strike="noStrike" cap="none" normalizeH="0" baseline="0" dirty="0">
                           <a:ln>
                             <a:noFill/>
                           </a:ln>
@@ -5360,19 +5312,8 @@
                           <a:latin typeface="Calibri" pitchFamily="34" charset="0"/>
                           <a:cs typeface="Calibri" pitchFamily="34" charset="0"/>
                         </a:rPr>
-                        <a:t>dd/mm/yy</a:t>
+                        <a:t>2018-Dec-15</a:t>
                       </a:r>
-                      <a:endParaRPr kumimoji="0" lang="en-AU" sz="1000" b="0" i="0" u="none" strike="noStrike" cap="none" normalizeH="0" baseline="0" dirty="0">
-                        <a:ln>
-                          <a:noFill/>
-                        </a:ln>
-                        <a:solidFill>
-                          <a:schemeClr val="tx1"/>
-                        </a:solidFill>
-                        <a:effectLst/>
-                        <a:latin typeface="Calibri" pitchFamily="34" charset="0"/>
-                        <a:cs typeface="Calibri" pitchFamily="34" charset="0"/>
-                      </a:endParaRPr>
                     </a:p>
                   </a:txBody>
                   <a:tcPr marL="43200" marR="0" marT="46800" marB="46800" anchor="ctr" horzOverflow="overflow">
@@ -5449,7 +5390,7 @@
                         </a:tabLst>
                       </a:pPr>
                       <a:r>
-                        <a:rPr kumimoji="0" lang="en-AU" sz="1000" b="0" i="0" u="none" strike="noStrike" cap="none" normalizeH="0" baseline="0">
+                        <a:rPr kumimoji="0" lang="en-AU" sz="1000" b="0" i="0" u="none" strike="noStrike" cap="none" normalizeH="0" baseline="0" dirty="0">
                           <a:ln>
                             <a:noFill/>
                           </a:ln>
@@ -5460,19 +5401,8 @@
                           <a:latin typeface="Calibri" pitchFamily="34" charset="0"/>
                           <a:cs typeface="Calibri" pitchFamily="34" charset="0"/>
                         </a:rPr>
-                        <a:t>dd/mm/yy</a:t>
+                        <a:t>2100-Apr-20</a:t>
                       </a:r>
-                      <a:endParaRPr kumimoji="0" lang="en-AU" sz="1000" b="0" i="0" u="none" strike="noStrike" cap="none" normalizeH="0" baseline="0" dirty="0">
-                        <a:ln>
-                          <a:noFill/>
-                        </a:ln>
-                        <a:solidFill>
-                          <a:schemeClr val="tx1"/>
-                        </a:solidFill>
-                        <a:effectLst/>
-                        <a:latin typeface="Calibri" pitchFamily="34" charset="0"/>
-                        <a:cs typeface="Calibri" pitchFamily="34" charset="0"/>
-                      </a:endParaRPr>
                     </a:p>
                   </a:txBody>
                   <a:tcPr marL="43200" marR="0" marT="46800" marB="46800" anchor="ctr" horzOverflow="overflow">
@@ -5646,17 +5576,20 @@
                         </a:tabLst>
                         <a:defRPr/>
                       </a:pPr>
-                      <a:endParaRPr kumimoji="0" lang="en-AU" sz="1000" b="0" i="0" u="none" strike="noStrike" cap="none" normalizeH="0" baseline="0" dirty="0">
-                        <a:ln>
-                          <a:noFill/>
-                        </a:ln>
-                        <a:solidFill>
-                          <a:schemeClr val="tx1"/>
-                        </a:solidFill>
-                        <a:effectLst/>
-                        <a:latin typeface="Calibri" pitchFamily="34" charset="0"/>
-                        <a:cs typeface="Calibri" pitchFamily="34" charset="0"/>
-                      </a:endParaRPr>
+                      <a:r>
+                        <a:rPr kumimoji="0" lang="en-AU" sz="1000" b="0" i="0" u="none" strike="noStrike" cap="none" normalizeH="0" baseline="0" dirty="0">
+                          <a:ln>
+                            <a:noFill/>
+                          </a:ln>
+                          <a:solidFill>
+                            <a:schemeClr val="tx1"/>
+                          </a:solidFill>
+                          <a:effectLst/>
+                          <a:latin typeface="Calibri" pitchFamily="34" charset="0"/>
+                          <a:cs typeface="Calibri" pitchFamily="34" charset="0"/>
+                        </a:rPr>
+                        <a:t>Have bot autonomously find an object with computer vision</a:t>
+                      </a:r>
                     </a:p>
                   </a:txBody>
                   <a:tcPr marL="43200" marR="0" marT="46800" marB="46800" horzOverflow="overflow">
@@ -5733,20 +5666,6 @@
                         </a:tabLst>
                       </a:pPr>
                       <a:r>
-                        <a:rPr kumimoji="0" lang="en-AU" sz="1000" b="0" i="0" u="none" strike="noStrike" cap="none" normalizeH="0" baseline="0" dirty="0" err="1">
-                          <a:ln>
-                            <a:noFill/>
-                          </a:ln>
-                          <a:solidFill>
-                            <a:schemeClr val="tx1"/>
-                          </a:solidFill>
-                          <a:effectLst/>
-                          <a:latin typeface="Calibri" pitchFamily="34" charset="0"/>
-                          <a:cs typeface="Calibri" pitchFamily="34" charset="0"/>
-                        </a:rPr>
-                        <a:t>dd</a:t>
-                      </a:r>
-                      <a:r>
                         <a:rPr kumimoji="0" lang="en-AU" sz="1000" b="0" i="0" u="none" strike="noStrike" cap="none" normalizeH="0" baseline="0" dirty="0">
                           <a:ln>
                             <a:noFill/>
@@ -5758,33 +5677,8 @@
                           <a:latin typeface="Calibri" pitchFamily="34" charset="0"/>
                           <a:cs typeface="Calibri" pitchFamily="34" charset="0"/>
                         </a:rPr>
-                        <a:t>/mm/</a:t>
+                        <a:t>2019-May-15</a:t>
                       </a:r>
-                      <a:r>
-                        <a:rPr kumimoji="0" lang="en-AU" sz="1000" b="0" i="0" u="none" strike="noStrike" cap="none" normalizeH="0" baseline="0" dirty="0" err="1">
-                          <a:ln>
-                            <a:noFill/>
-                          </a:ln>
-                          <a:solidFill>
-                            <a:schemeClr val="tx1"/>
-                          </a:solidFill>
-                          <a:effectLst/>
-                          <a:latin typeface="Calibri" pitchFamily="34" charset="0"/>
-                          <a:cs typeface="Calibri" pitchFamily="34" charset="0"/>
-                        </a:rPr>
-                        <a:t>yy</a:t>
-                      </a:r>
-                      <a:endParaRPr kumimoji="0" lang="en-AU" sz="1000" b="0" i="0" u="none" strike="noStrike" cap="none" normalizeH="0" baseline="0" dirty="0">
-                        <a:ln>
-                          <a:noFill/>
-                        </a:ln>
-                        <a:solidFill>
-                          <a:schemeClr val="tx1"/>
-                        </a:solidFill>
-                        <a:effectLst/>
-                        <a:latin typeface="Calibri" pitchFamily="34" charset="0"/>
-                        <a:cs typeface="Calibri" pitchFamily="34" charset="0"/>
-                      </a:endParaRPr>
                     </a:p>
                   </a:txBody>
                   <a:tcPr marL="43200" marR="0" marT="46800" marB="46800" anchor="ctr" horzOverflow="overflow">
@@ -5861,20 +5755,6 @@
                         </a:tabLst>
                       </a:pPr>
                       <a:r>
-                        <a:rPr kumimoji="0" lang="en-AU" sz="1000" b="0" i="0" u="none" strike="noStrike" cap="none" normalizeH="0" baseline="0" dirty="0" err="1">
-                          <a:ln>
-                            <a:noFill/>
-                          </a:ln>
-                          <a:solidFill>
-                            <a:schemeClr val="tx1"/>
-                          </a:solidFill>
-                          <a:effectLst/>
-                          <a:latin typeface="Calibri" pitchFamily="34" charset="0"/>
-                          <a:cs typeface="Calibri" pitchFamily="34" charset="0"/>
-                        </a:rPr>
-                        <a:t>dd</a:t>
-                      </a:r>
-                      <a:r>
                         <a:rPr kumimoji="0" lang="en-AU" sz="1000" b="0" i="0" u="none" strike="noStrike" cap="none" normalizeH="0" baseline="0" dirty="0">
                           <a:ln>
                             <a:noFill/>
@@ -5886,33 +5766,8 @@
                           <a:latin typeface="Calibri" pitchFamily="34" charset="0"/>
                           <a:cs typeface="Calibri" pitchFamily="34" charset="0"/>
                         </a:rPr>
-                        <a:t>/mm/</a:t>
+                        <a:t>∞</a:t>
                       </a:r>
-                      <a:r>
-                        <a:rPr kumimoji="0" lang="en-AU" sz="1000" b="0" i="0" u="none" strike="noStrike" cap="none" normalizeH="0" baseline="0" dirty="0" err="1">
-                          <a:ln>
-                            <a:noFill/>
-                          </a:ln>
-                          <a:solidFill>
-                            <a:schemeClr val="tx1"/>
-                          </a:solidFill>
-                          <a:effectLst/>
-                          <a:latin typeface="Calibri" pitchFamily="34" charset="0"/>
-                          <a:cs typeface="Calibri" pitchFamily="34" charset="0"/>
-                        </a:rPr>
-                        <a:t>yy</a:t>
-                      </a:r>
-                      <a:endParaRPr kumimoji="0" lang="en-AU" sz="1000" b="0" i="0" u="none" strike="noStrike" cap="none" normalizeH="0" baseline="0" dirty="0">
-                        <a:ln>
-                          <a:noFill/>
-                        </a:ln>
-                        <a:solidFill>
-                          <a:schemeClr val="tx1"/>
-                        </a:solidFill>
-                        <a:effectLst/>
-                        <a:latin typeface="Calibri" pitchFamily="34" charset="0"/>
-                        <a:cs typeface="Calibri" pitchFamily="34" charset="0"/>
-                      </a:endParaRPr>
                     </a:p>
                   </a:txBody>
                   <a:tcPr marL="43200" marR="0" marT="46800" marB="46800" anchor="ctr" horzOverflow="overflow">
@@ -7485,7 +7340,7 @@
           <p:nvPr>
             <p:extLst>
               <p:ext uri="{D42A27DB-BD31-4B8C-83A1-F6EECF244321}">
-                <p14:modId xmlns:p14="http://schemas.microsoft.com/office/powerpoint/2010/main" val="386199636"/>
+                <p14:modId xmlns:p14="http://schemas.microsoft.com/office/powerpoint/2010/main" val="3394567985"/>
               </p:ext>
             </p:extLst>
           </p:nvPr>
@@ -7641,51 +7496,36 @@
                           <a:latin typeface="Calibri" pitchFamily="34" charset="0"/>
                           <a:cs typeface="Calibri" pitchFamily="34" charset="0"/>
                         </a:rPr>
-                        <a:t>[Please describe any issues involving your communication with your customer or stakeholder.  Please include whether you met with your customer. ]</a:t>
+                        <a:t>We met with </a:t>
                       </a:r>
-                      <a:endParaRPr kumimoji="0" lang="en-AU" sz="1000" b="0" i="0" u="none" strike="noStrike" kern="1200" cap="none" normalizeH="0" baseline="0" dirty="0">
-                        <a:ln>
-                          <a:noFill/>
-                        </a:ln>
-                        <a:solidFill>
-                          <a:schemeClr val="tx1"/>
-                        </a:solidFill>
-                        <a:effectLst/>
-                        <a:latin typeface="Calibri" pitchFamily="34" charset="0"/>
-                        <a:ea typeface="+mn-ea"/>
-                        <a:cs typeface="Calibri" pitchFamily="34" charset="0"/>
-                      </a:endParaRPr>
-                    </a:p>
-                    <a:p>
-                      <a:pPr marL="190500" marR="0" lvl="0" indent="-190500" algn="l" defTabSz="695325" rtl="0" eaLnBrk="1" fontAlgn="base" latinLnBrk="0" hangingPunct="1">
-                        <a:lnSpc>
-                          <a:spcPct val="90000"/>
-                        </a:lnSpc>
-                        <a:spcBef>
-                          <a:spcPct val="30000"/>
-                        </a:spcBef>
-                        <a:spcAft>
-                          <a:spcPct val="0"/>
-                        </a:spcAft>
-                        <a:buClr>
-                          <a:srgbClr val="0A1B5F"/>
-                        </a:buClr>
-                        <a:buSzTx/>
-                        <a:buFontTx/>
-                        <a:buChar char="•"/>
-                        <a:tabLst/>
-                      </a:pPr>
-                      <a:endParaRPr kumimoji="0" lang="en-AU" sz="1000" b="0" i="0" u="none" strike="noStrike" cap="none" normalizeH="0" baseline="0" dirty="0">
-                        <a:ln>
-                          <a:noFill/>
-                        </a:ln>
-                        <a:solidFill>
-                          <a:schemeClr val="tx1"/>
-                        </a:solidFill>
-                        <a:effectLst/>
-                        <a:latin typeface="Calibri" pitchFamily="34" charset="0"/>
-                        <a:cs typeface="Calibri" pitchFamily="34" charset="0"/>
-                      </a:endParaRPr>
+                      <a:r>
+                        <a:rPr kumimoji="0" lang="en-AU" sz="1000" b="0" i="0" u="none" strike="noStrike" cap="none" normalizeH="0" baseline="0" dirty="0" err="1">
+                          <a:ln>
+                            <a:noFill/>
+                          </a:ln>
+                          <a:solidFill>
+                            <a:schemeClr val="tx1"/>
+                          </a:solidFill>
+                          <a:effectLst/>
+                          <a:latin typeface="Calibri" pitchFamily="34" charset="0"/>
+                          <a:cs typeface="Calibri" pitchFamily="34" charset="0"/>
+                        </a:rPr>
+                        <a:t>Dr.</a:t>
+                      </a:r>
+                      <a:r>
+                        <a:rPr kumimoji="0" lang="en-AU" sz="1000" b="0" i="0" u="none" strike="noStrike" cap="none" normalizeH="0" baseline="0" dirty="0">
+                          <a:ln>
+                            <a:noFill/>
+                          </a:ln>
+                          <a:solidFill>
+                            <a:schemeClr val="tx1"/>
+                          </a:solidFill>
+                          <a:effectLst/>
+                          <a:latin typeface="Calibri" pitchFamily="34" charset="0"/>
+                          <a:cs typeface="Calibri" pitchFamily="34" charset="0"/>
+                        </a:rPr>
+                        <a:t> McCourt Oct/4</a:t>
+                      </a:r>
                     </a:p>
                   </a:txBody>
                   <a:tcPr marL="49846" marR="49846" marT="54000" marB="54000" horzOverflow="overflow">
@@ -7755,7 +7595,7 @@
           <p:nvPr>
             <p:extLst>
               <p:ext uri="{D42A27DB-BD31-4B8C-83A1-F6EECF244321}">
-                <p14:modId xmlns:p14="http://schemas.microsoft.com/office/powerpoint/2010/main" val="2457970757"/>
+                <p14:modId xmlns:p14="http://schemas.microsoft.com/office/powerpoint/2010/main" val="2799996421"/>
               </p:ext>
             </p:extLst>
           </p:nvPr>

</xml_diff>

<commit_message>
this weeks weekly report and foil are DONE
</commit_message>
<xml_diff>
--- a/10.10.pptx
+++ b/10.10.pptx
@@ -3112,7 +3112,7 @@
           <p:nvPr>
             <p:extLst>
               <p:ext uri="{D42A27DB-BD31-4B8C-83A1-F6EECF244321}">
-                <p14:modId xmlns:p14="http://schemas.microsoft.com/office/powerpoint/2010/main" val="3190375179"/>
+                <p14:modId xmlns:p14="http://schemas.microsoft.com/office/powerpoint/2010/main" val="770772208"/>
               </p:ext>
             </p:extLst>
           </p:nvPr>
@@ -3306,7 +3306,7 @@
                           <a:ea typeface="+mn-ea"/>
                           <a:cs typeface="Calibri" pitchFamily="34" charset="0"/>
                         </a:rPr>
-                        <a:t>Ammon – None</a:t>
+                        <a:t>Ammon – Started reading the documentation for ROS and actually exploring the limitations of the device to see whether the device </a:t>
                       </a:r>
                     </a:p>
                     <a:p>
@@ -3342,8 +3342,35 @@
                           <a:ea typeface="+mn-ea"/>
                           <a:cs typeface="Calibri" pitchFamily="34" charset="0"/>
                         </a:rPr>
-                        <a:t>Jake – made proposal “foil”</a:t>
+                        <a:t>Jake – made proposal “foil”, scheduled meetings with Mike and began reading </a:t>
                       </a:r>
+                      <a:r>
+                        <a:rPr kumimoji="0" lang="en-US" sz="1000" b="0" i="0" u="none" strike="noStrike" kern="1200" cap="none" normalizeH="0" baseline="0" dirty="0">
+                          <a:ln>
+                            <a:noFill/>
+                          </a:ln>
+                          <a:solidFill>
+                            <a:schemeClr val="tx1"/>
+                          </a:solidFill>
+                          <a:effectLst/>
+                          <a:latin typeface="Calibri" pitchFamily="34" charset="0"/>
+                          <a:ea typeface="+mn-ea"/>
+                          <a:cs typeface="Calibri" pitchFamily="34" charset="0"/>
+                        </a:rPr>
+                        <a:t>Robot Operating System for Absolute Beginners by Lentin Joseph</a:t>
+                      </a:r>
+                      <a:endParaRPr kumimoji="0" lang="en-AU" sz="1000" b="0" i="0" u="none" strike="noStrike" kern="1200" cap="none" normalizeH="0" baseline="0" dirty="0">
+                        <a:ln>
+                          <a:noFill/>
+                        </a:ln>
+                        <a:solidFill>
+                          <a:schemeClr val="tx1"/>
+                        </a:solidFill>
+                        <a:effectLst/>
+                        <a:latin typeface="Calibri" pitchFamily="34" charset="0"/>
+                        <a:ea typeface="+mn-ea"/>
+                        <a:cs typeface="Calibri" pitchFamily="34" charset="0"/>
+                      </a:endParaRPr>
                     </a:p>
                     <a:p>
                       <a:pPr marL="190500" marR="0" lvl="0" indent="-190500" algn="l" defTabSz="695325" rtl="0" eaLnBrk="1" fontAlgn="base" latinLnBrk="0" hangingPunct="1">
@@ -3378,7 +3405,7 @@
                           <a:ea typeface="+mn-ea"/>
                           <a:cs typeface="Calibri" pitchFamily="34" charset="0"/>
                         </a:rPr>
-                        <a:t>Alex – stuff and possibly things</a:t>
+                        <a:t>Alex – joined the group and got brought up to speed with the projects requirements.</a:t>
                       </a:r>
                     </a:p>
                     <a:p>
@@ -3482,7 +3509,7 @@
           <p:nvPr>
             <p:extLst>
               <p:ext uri="{D42A27DB-BD31-4B8C-83A1-F6EECF244321}">
-                <p14:modId xmlns:p14="http://schemas.microsoft.com/office/powerpoint/2010/main" val="361514992"/>
+                <p14:modId xmlns:p14="http://schemas.microsoft.com/office/powerpoint/2010/main" val="2727826433"/>
               </p:ext>
             </p:extLst>
           </p:nvPr>
@@ -3640,37 +3667,7 @@
                           <a:ea typeface="+mn-ea"/>
                           <a:cs typeface="Calibri" pitchFamily="34" charset="0"/>
                         </a:rPr>
-                        <a:t>Do “</a:t>
-                      </a:r>
-                      <a:r>
-                        <a:rPr kumimoji="0" lang="en-AU" sz="1000" b="0" i="0" u="none" strike="noStrike" kern="1200" cap="none" normalizeH="0" baseline="0" dirty="0" err="1">
-                          <a:ln>
-                            <a:noFill/>
-                          </a:ln>
-                          <a:solidFill>
-                            <a:schemeClr val="tx1"/>
-                          </a:solidFill>
-                          <a:effectLst/>
-                          <a:latin typeface="Calibri" pitchFamily="34" charset="0"/>
-                          <a:ea typeface="+mn-ea"/>
-                          <a:cs typeface="Calibri" pitchFamily="34" charset="0"/>
-                        </a:rPr>
-                        <a:t>Hellow</a:t>
-                      </a:r>
-                      <a:r>
-                        <a:rPr kumimoji="0" lang="en-AU" sz="1000" b="0" i="0" u="none" strike="noStrike" kern="1200" cap="none" normalizeH="0" baseline="0" dirty="0">
-                          <a:ln>
-                            <a:noFill/>
-                          </a:ln>
-                          <a:solidFill>
-                            <a:schemeClr val="tx1"/>
-                          </a:solidFill>
-                          <a:effectLst/>
-                          <a:latin typeface="Calibri" pitchFamily="34" charset="0"/>
-                          <a:ea typeface="+mn-ea"/>
-                          <a:cs typeface="Calibri" pitchFamily="34" charset="0"/>
-                        </a:rPr>
-                        <a:t> World” in ROS</a:t>
+                        <a:t>Do “Hello world!” in ROS (Actually exploring the ins and outs of ROS)</a:t>
                       </a:r>
                     </a:p>
                     <a:p>
@@ -3810,7 +3807,7 @@
           <p:nvPr>
             <p:extLst>
               <p:ext uri="{D42A27DB-BD31-4B8C-83A1-F6EECF244321}">
-                <p14:modId xmlns:p14="http://schemas.microsoft.com/office/powerpoint/2010/main" val="2898068219"/>
+                <p14:modId xmlns:p14="http://schemas.microsoft.com/office/powerpoint/2010/main" val="1752428075"/>
               </p:ext>
             </p:extLst>
           </p:nvPr>
@@ -3967,7 +3964,77 @@
                           <a:latin typeface="Calibri" pitchFamily="34" charset="0"/>
                           <a:cs typeface="Calibri" pitchFamily="34" charset="0"/>
                         </a:rPr>
-                        <a:t>Primary concerns include finding a starting point for this project, having a place to stand with access to tools, getting a foothold.</a:t>
+                        <a:t>We need to actually figure out how we’re going to get the hardware to work. </a:t>
+                      </a:r>
+                    </a:p>
+                    <a:p>
+                      <a:pPr marL="190500" marR="0" lvl="0" indent="-190500" algn="l" defTabSz="695325" rtl="0" eaLnBrk="1" fontAlgn="base" latinLnBrk="0" hangingPunct="1">
+                        <a:lnSpc>
+                          <a:spcPct val="90000"/>
+                        </a:lnSpc>
+                        <a:spcBef>
+                          <a:spcPct val="30000"/>
+                        </a:spcBef>
+                        <a:spcAft>
+                          <a:spcPct val="0"/>
+                        </a:spcAft>
+                        <a:buClr>
+                          <a:srgbClr val="0A1B5F"/>
+                        </a:buClr>
+                        <a:buSzTx/>
+                        <a:buFontTx/>
+                        <a:buChar char="•"/>
+                        <a:tabLst/>
+                        <a:defRPr/>
+                      </a:pPr>
+                      <a:r>
+                        <a:rPr kumimoji="0" lang="en-AU" sz="1000" b="0" i="0" u="none" strike="noStrike" cap="none" normalizeH="0" baseline="0" dirty="0">
+                          <a:ln>
+                            <a:noFill/>
+                          </a:ln>
+                          <a:solidFill>
+                            <a:schemeClr val="tx1"/>
+                          </a:solidFill>
+                          <a:effectLst/>
+                          <a:latin typeface="Calibri" pitchFamily="34" charset="0"/>
+                          <a:cs typeface="Calibri" pitchFamily="34" charset="0"/>
+                        </a:rPr>
+                        <a:t>The major risk we had this week was not having enough people the project but that has changed with the introduction to the group.</a:t>
+                      </a:r>
+                    </a:p>
+                    <a:p>
+                      <a:pPr marL="190500" marR="0" lvl="0" indent="-190500" algn="l" defTabSz="695325" rtl="0" eaLnBrk="1" fontAlgn="base" latinLnBrk="0" hangingPunct="1">
+                        <a:lnSpc>
+                          <a:spcPct val="90000"/>
+                        </a:lnSpc>
+                        <a:spcBef>
+                          <a:spcPct val="30000"/>
+                        </a:spcBef>
+                        <a:spcAft>
+                          <a:spcPct val="0"/>
+                        </a:spcAft>
+                        <a:buClr>
+                          <a:srgbClr val="0A1B5F"/>
+                        </a:buClr>
+                        <a:buSzTx/>
+                        <a:buFontTx/>
+                        <a:buChar char="•"/>
+                        <a:tabLst/>
+                        <a:defRPr/>
+                      </a:pPr>
+                      <a:r>
+                        <a:rPr kumimoji="0" lang="en-AU" sz="1000" b="0" i="0" u="none" strike="noStrike" cap="none" normalizeH="0" baseline="0" dirty="0">
+                          <a:ln>
+                            <a:noFill/>
+                          </a:ln>
+                          <a:solidFill>
+                            <a:schemeClr val="tx1"/>
+                          </a:solidFill>
+                          <a:effectLst/>
+                          <a:latin typeface="Calibri" pitchFamily="34" charset="0"/>
+                          <a:cs typeface="Calibri" pitchFamily="34" charset="0"/>
+                        </a:rPr>
+                        <a:t>We scrapped  one of the goals for the project from last week.</a:t>
                       </a:r>
                     </a:p>
                   </a:txBody>
@@ -7340,7 +7407,7 @@
           <p:nvPr>
             <p:extLst>
               <p:ext uri="{D42A27DB-BD31-4B8C-83A1-F6EECF244321}">
-                <p14:modId xmlns:p14="http://schemas.microsoft.com/office/powerpoint/2010/main" val="3394567985"/>
+                <p14:modId xmlns:p14="http://schemas.microsoft.com/office/powerpoint/2010/main" val="3446233266"/>
               </p:ext>
             </p:extLst>
           </p:nvPr>
@@ -7524,7 +7591,7 @@
                           <a:latin typeface="Calibri" pitchFamily="34" charset="0"/>
                           <a:cs typeface="Calibri" pitchFamily="34" charset="0"/>
                         </a:rPr>
-                        <a:t> McCourt Oct/4</a:t>
+                        <a:t> McCourt Oct/4 where we explored the eventualities of the project and defined the product cycle.</a:t>
                       </a:r>
                     </a:p>
                   </a:txBody>
@@ -7595,7 +7662,7 @@
           <p:nvPr>
             <p:extLst>
               <p:ext uri="{D42A27DB-BD31-4B8C-83A1-F6EECF244321}">
-                <p14:modId xmlns:p14="http://schemas.microsoft.com/office/powerpoint/2010/main" val="2799996421"/>
+                <p14:modId xmlns:p14="http://schemas.microsoft.com/office/powerpoint/2010/main" val="3247269557"/>
               </p:ext>
             </p:extLst>
           </p:nvPr>
@@ -7751,7 +7818,7 @@
                           <a:latin typeface="Calibri" pitchFamily="34" charset="0"/>
                           <a:cs typeface="Calibri" pitchFamily="34" charset="0"/>
                         </a:rPr>
-                        <a:t>[Key discussion areas]</a:t>
+                        <a:t>“What do we actually want to achieve with this project?” seemed like the most salient discussion from this week.</a:t>
                       </a:r>
                     </a:p>
                   </a:txBody>
@@ -7836,19 +7903,20 @@
           <a:lstStyle/>
           <a:p>
             <a:r>
-              <a:rPr lang="en-US" sz="2400" dirty="0" err="1"/>
-              <a:t>SLAM_Burger_Fluid_Pather</a:t>
+              <a:rPr lang="en-US" sz="2400" dirty="0"/>
+              <a:t>Object Recognition and Path Smoothing Robot</a:t>
+            </a:r>
+          </a:p>
+          <a:p>
+            <a:r>
+              <a:rPr lang="en-US" sz="1200" dirty="0"/>
+              <a:t>Team Members: Ammon Dodson, Alex Marlow</a:t>
             </a:r>
             <a:r>
-              <a:rPr lang="en-US" sz="2400" dirty="0"/>
-              <a:t> a.k.a. TRAPS</a:t>
+              <a:rPr lang="en-US" sz="1200"/>
+              <a:t>, Jake McKenzie</a:t>
             </a:r>
-          </a:p>
-          <a:p>
-            <a:r>
-              <a:rPr lang="en-US" sz="1200" dirty="0"/>
-              <a:t>Team Members: Jake McKenzie, Ammon Dodson, Alex</a:t>
-            </a:r>
+            <a:endParaRPr lang="en-US" sz="1200" dirty="0"/>
           </a:p>
         </p:txBody>
       </p:sp>

</xml_diff>